<commit_message>
Update images for command box.
</commit_message>
<xml_diff>
--- a/docs/images/userguideimages/Powerpoints/User Guide Section 4.4 Itinerary Attraction.pptx
+++ b/docs/images/userguideimages/Powerpoints/User Guide Section 4.4 Itinerary Attraction.pptx
@@ -214,7 +214,7 @@
           <a:p>
             <a:fld id="{A62B7A5B-BC50-4C9A-997A-AC15A9A7C551}" type="datetimeFigureOut">
               <a:rPr lang="en-SG" smtClean="0"/>
-              <a:t>8/11/2020</a:t>
+              <a:t>9/11/2020</a:t>
             </a:fld>
             <a:endParaRPr lang="en-SG"/>
           </a:p>
@@ -1405,7 +1405,7 @@
           <a:p>
             <a:fld id="{0AD9AA4E-F04C-4CE3-8C45-C860B1383B1F}" type="datetimeFigureOut">
               <a:rPr lang="en-SG" smtClean="0"/>
-              <a:t>8/11/2020</a:t>
+              <a:t>9/11/2020</a:t>
             </a:fld>
             <a:endParaRPr lang="en-SG"/>
           </a:p>
@@ -1575,7 +1575,7 @@
           <a:p>
             <a:fld id="{0AD9AA4E-F04C-4CE3-8C45-C860B1383B1F}" type="datetimeFigureOut">
               <a:rPr lang="en-SG" smtClean="0"/>
-              <a:t>8/11/2020</a:t>
+              <a:t>9/11/2020</a:t>
             </a:fld>
             <a:endParaRPr lang="en-SG"/>
           </a:p>
@@ -1755,7 +1755,7 @@
           <a:p>
             <a:fld id="{0AD9AA4E-F04C-4CE3-8C45-C860B1383B1F}" type="datetimeFigureOut">
               <a:rPr lang="en-SG" smtClean="0"/>
-              <a:t>8/11/2020</a:t>
+              <a:t>9/11/2020</a:t>
             </a:fld>
             <a:endParaRPr lang="en-SG"/>
           </a:p>
@@ -1925,7 +1925,7 @@
           <a:p>
             <a:fld id="{0AD9AA4E-F04C-4CE3-8C45-C860B1383B1F}" type="datetimeFigureOut">
               <a:rPr lang="en-SG" smtClean="0"/>
-              <a:t>8/11/2020</a:t>
+              <a:t>9/11/2020</a:t>
             </a:fld>
             <a:endParaRPr lang="en-SG"/>
           </a:p>
@@ -2169,7 +2169,7 @@
           <a:p>
             <a:fld id="{0AD9AA4E-F04C-4CE3-8C45-C860B1383B1F}" type="datetimeFigureOut">
               <a:rPr lang="en-SG" smtClean="0"/>
-              <a:t>8/11/2020</a:t>
+              <a:t>9/11/2020</a:t>
             </a:fld>
             <a:endParaRPr lang="en-SG"/>
           </a:p>
@@ -2401,7 +2401,7 @@
           <a:p>
             <a:fld id="{0AD9AA4E-F04C-4CE3-8C45-C860B1383B1F}" type="datetimeFigureOut">
               <a:rPr lang="en-SG" smtClean="0"/>
-              <a:t>8/11/2020</a:t>
+              <a:t>9/11/2020</a:t>
             </a:fld>
             <a:endParaRPr lang="en-SG"/>
           </a:p>
@@ -2768,7 +2768,7 @@
           <a:p>
             <a:fld id="{0AD9AA4E-F04C-4CE3-8C45-C860B1383B1F}" type="datetimeFigureOut">
               <a:rPr lang="en-SG" smtClean="0"/>
-              <a:t>8/11/2020</a:t>
+              <a:t>9/11/2020</a:t>
             </a:fld>
             <a:endParaRPr lang="en-SG"/>
           </a:p>
@@ -2886,7 +2886,7 @@
           <a:p>
             <a:fld id="{0AD9AA4E-F04C-4CE3-8C45-C860B1383B1F}" type="datetimeFigureOut">
               <a:rPr lang="en-SG" smtClean="0"/>
-              <a:t>8/11/2020</a:t>
+              <a:t>9/11/2020</a:t>
             </a:fld>
             <a:endParaRPr lang="en-SG"/>
           </a:p>
@@ -2981,7 +2981,7 @@
           <a:p>
             <a:fld id="{0AD9AA4E-F04C-4CE3-8C45-C860B1383B1F}" type="datetimeFigureOut">
               <a:rPr lang="en-SG" smtClean="0"/>
-              <a:t>8/11/2020</a:t>
+              <a:t>9/11/2020</a:t>
             </a:fld>
             <a:endParaRPr lang="en-SG"/>
           </a:p>
@@ -3258,7 +3258,7 @@
           <a:p>
             <a:fld id="{0AD9AA4E-F04C-4CE3-8C45-C860B1383B1F}" type="datetimeFigureOut">
               <a:rPr lang="en-SG" smtClean="0"/>
-              <a:t>8/11/2020</a:t>
+              <a:t>9/11/2020</a:t>
             </a:fld>
             <a:endParaRPr lang="en-SG"/>
           </a:p>
@@ -3515,7 +3515,7 @@
           <a:p>
             <a:fld id="{0AD9AA4E-F04C-4CE3-8C45-C860B1383B1F}" type="datetimeFigureOut">
               <a:rPr lang="en-SG" smtClean="0"/>
-              <a:t>8/11/2020</a:t>
+              <a:t>9/11/2020</a:t>
             </a:fld>
             <a:endParaRPr lang="en-SG"/>
           </a:p>
@@ -3728,7 +3728,7 @@
           <a:p>
             <a:fld id="{0AD9AA4E-F04C-4CE3-8C45-C860B1383B1F}" type="datetimeFigureOut">
               <a:rPr lang="en-SG" smtClean="0"/>
-              <a:t>8/11/2020</a:t>
+              <a:t>9/11/2020</a:t>
             </a:fld>
             <a:endParaRPr lang="en-SG"/>
           </a:p>
@@ -5284,7 +5284,7 @@
                   <a:srgbClr val="FF0000"/>
                 </a:solidFill>
               </a:rPr>
-              <a:t>Type here</a:t>
+              <a:t>Enter command here</a:t>
             </a:r>
           </a:p>
         </p:txBody>
@@ -5922,7 +5922,7 @@
                   <a:srgbClr val="FF0000"/>
                 </a:solidFill>
               </a:rPr>
-              <a:t>Type here</a:t>
+              <a:t>Enter command here</a:t>
             </a:r>
           </a:p>
         </p:txBody>
@@ -6450,7 +6450,7 @@
                   <a:srgbClr val="FF0000"/>
                 </a:solidFill>
               </a:rPr>
-              <a:t>Type here</a:t>
+              <a:t>Enter command here</a:t>
             </a:r>
           </a:p>
         </p:txBody>
@@ -7025,6 +7025,21 @@
 </file>
 
 <file path=customXml/item1.xml><?xml version="1.0" encoding="utf-8"?>
+<p:properties xmlns:p="http://schemas.microsoft.com/office/2006/metadata/properties" xmlns:xsi="http://www.w3.org/2001/XMLSchema-instance" xmlns:pc="http://schemas.microsoft.com/office/infopath/2007/PartnerControls">
+  <documentManagement/>
+</p:properties>
+</file>
+
+<file path=customXml/item2.xml><?xml version="1.0" encoding="utf-8"?>
+<?mso-contentType ?>
+<FormTemplates xmlns="http://schemas.microsoft.com/sharepoint/v3/contenttype/forms">
+  <Display>DocumentLibraryForm</Display>
+  <Edit>DocumentLibraryForm</Edit>
+  <New>DocumentLibraryForm</New>
+</FormTemplates>
+</file>
+
+<file path=customXml/item3.xml><?xml version="1.0" encoding="utf-8"?>
 <ct:contentTypeSchema xmlns:ct="http://schemas.microsoft.com/office/2006/metadata/contentType" xmlns:ma="http://schemas.microsoft.com/office/2006/metadata/properties/metaAttributes" ct:_="" ma:_="" ma:contentTypeName="Document" ma:contentTypeID="0x0101008903939AEF71C54EA0E8855FDE9FB070" ma:contentTypeVersion="13" ma:contentTypeDescription="Create a new document." ma:contentTypeScope="" ma:versionID="cc8bdd08984210fd4111e5bd6a3f7fcb">
   <xsd:schema xmlns:xsd="http://www.w3.org/2001/XMLSchema" xmlns:xs="http://www.w3.org/2001/XMLSchema" xmlns:p="http://schemas.microsoft.com/office/2006/metadata/properties" xmlns:ns3="fb12fa8a-7d54-432c-aeae-1d3bbc5870dc" xmlns:ns4="70ba9438-d093-4082-88c3-fa5e1023f6bd" targetNamespace="http://schemas.microsoft.com/office/2006/metadata/properties" ma:root="true" ma:fieldsID="16e276cb5d63e7b1eaf24ea3a6a37a68" ns3:_="" ns4:_="">
     <xsd:import namespace="fb12fa8a-7d54-432c-aeae-1d3bbc5870dc"/>
@@ -7247,22 +7262,32 @@
 </ct:contentTypeSchema>
 </file>
 
-<file path=customXml/item2.xml><?xml version="1.0" encoding="utf-8"?>
-<?mso-contentType ?>
-<FormTemplates xmlns="http://schemas.microsoft.com/sharepoint/v3/contenttype/forms">
-  <Display>DocumentLibraryForm</Display>
-  <Edit>DocumentLibraryForm</Edit>
-  <New>DocumentLibraryForm</New>
-</FormTemplates>
+<file path=customXml/itemProps1.xml><?xml version="1.0" encoding="utf-8"?>
+<ds:datastoreItem xmlns:ds="http://schemas.openxmlformats.org/officeDocument/2006/customXml" ds:itemID="{35AC9FD9-8C30-4A04-87B3-7DB6D0EB2456}">
+  <ds:schemaRefs>
+    <ds:schemaRef ds:uri="http://schemas.microsoft.com/office/infopath/2007/PartnerControls"/>
+    <ds:schemaRef ds:uri="http://schemas.microsoft.com/office/2006/documentManagement/types"/>
+    <ds:schemaRef ds:uri="http://schemas.openxmlformats.org/package/2006/metadata/core-properties"/>
+    <ds:schemaRef ds:uri="http://purl.org/dc/dcmitype/"/>
+    <ds:schemaRef ds:uri="http://www.w3.org/XML/1998/namespace"/>
+    <ds:schemaRef ds:uri="http://purl.org/dc/elements/1.1/"/>
+    <ds:schemaRef ds:uri="http://purl.org/dc/terms/"/>
+    <ds:schemaRef ds:uri="http://schemas.microsoft.com/office/2006/metadata/properties"/>
+    <ds:schemaRef ds:uri="70ba9438-d093-4082-88c3-fa5e1023f6bd"/>
+    <ds:schemaRef ds:uri="fb12fa8a-7d54-432c-aeae-1d3bbc5870dc"/>
+  </ds:schemaRefs>
+</ds:datastoreItem>
 </file>
 
-<file path=customXml/item3.xml><?xml version="1.0" encoding="utf-8"?>
-<p:properties xmlns:p="http://schemas.microsoft.com/office/2006/metadata/properties" xmlns:xsi="http://www.w3.org/2001/XMLSchema-instance" xmlns:pc="http://schemas.microsoft.com/office/infopath/2007/PartnerControls">
-  <documentManagement/>
-</p:properties>
+<file path=customXml/itemProps2.xml><?xml version="1.0" encoding="utf-8"?>
+<ds:datastoreItem xmlns:ds="http://schemas.openxmlformats.org/officeDocument/2006/customXml" ds:itemID="{995D33D4-B32D-4069-8711-A0AF92B23127}">
+  <ds:schemaRefs>
+    <ds:schemaRef ds:uri="http://schemas.microsoft.com/sharepoint/v3/contenttype/forms"/>
+  </ds:schemaRefs>
+</ds:datastoreItem>
 </file>
 
-<file path=customXml/itemProps1.xml><?xml version="1.0" encoding="utf-8"?>
+<file path=customXml/itemProps3.xml><?xml version="1.0" encoding="utf-8"?>
 <ds:datastoreItem xmlns:ds="http://schemas.openxmlformats.org/officeDocument/2006/customXml" ds:itemID="{BF287185-2361-4B62-88D4-9BEA7721F47B}">
   <ds:schemaRefs>
     <ds:schemaRef ds:uri="http://schemas.microsoft.com/office/2006/metadata/contentType"/>
@@ -7279,29 +7304,4 @@
     <ds:schemaRef ds:uri="http://schemas.microsoft.com/internal/obd"/>
   </ds:schemaRefs>
 </ds:datastoreItem>
-</file>
-
-<file path=customXml/itemProps2.xml><?xml version="1.0" encoding="utf-8"?>
-<ds:datastoreItem xmlns:ds="http://schemas.openxmlformats.org/officeDocument/2006/customXml" ds:itemID="{995D33D4-B32D-4069-8711-A0AF92B23127}">
-  <ds:schemaRefs>
-    <ds:schemaRef ds:uri="http://schemas.microsoft.com/sharepoint/v3/contenttype/forms"/>
-  </ds:schemaRefs>
-</ds:datastoreItem>
-</file>
-
-<file path=customXml/itemProps3.xml><?xml version="1.0" encoding="utf-8"?>
-<ds:datastoreItem xmlns:ds="http://schemas.openxmlformats.org/officeDocument/2006/customXml" ds:itemID="{35AC9FD9-8C30-4A04-87B3-7DB6D0EB2456}">
-  <ds:schemaRefs>
-    <ds:schemaRef ds:uri="http://schemas.microsoft.com/office/infopath/2007/PartnerControls"/>
-    <ds:schemaRef ds:uri="http://schemas.microsoft.com/office/2006/documentManagement/types"/>
-    <ds:schemaRef ds:uri="http://schemas.openxmlformats.org/package/2006/metadata/core-properties"/>
-    <ds:schemaRef ds:uri="http://purl.org/dc/dcmitype/"/>
-    <ds:schemaRef ds:uri="http://www.w3.org/XML/1998/namespace"/>
-    <ds:schemaRef ds:uri="http://purl.org/dc/elements/1.1/"/>
-    <ds:schemaRef ds:uri="http://purl.org/dc/terms/"/>
-    <ds:schemaRef ds:uri="http://schemas.microsoft.com/office/2006/metadata/properties"/>
-    <ds:schemaRef ds:uri="70ba9438-d093-4082-88c3-fa5e1023f6bd"/>
-    <ds:schemaRef ds:uri="fb12fa8a-7d54-432c-aeae-1d3bbc5870dc"/>
-  </ds:schemaRefs>
-</ds:datastoreItem>
 </file>
</xml_diff>